<commit_message>
Replaced some files in the tutorials.
Former-commit-id: b20ffd1a97b68ff0d1da9f731d59bf494ef52187
</commit_message>
<xml_diff>
--- a/tutorials/2/2_OptionalAttachment.pptx
+++ b/tutorials/2/2_OptionalAttachment.pptx
@@ -366,7 +366,7 @@
             <a:fld id="{B1CF722C-EDCC-40D1-B45D-E2D78C08F80A}" type="datetimeFigureOut">
               <a:rPr lang="en-US" smtClean="0"/>
               <a:pPr/>
-              <a:t>5/30/2015</a:t>
+              <a:t>9/3/2015</a:t>
             </a:fld>
             <a:endParaRPr lang="en-US"/>
           </a:p>
@@ -849,7 +849,7 @@
             <a:fld id="{329C895A-E49C-4247-A51B-0504EC639A15}" type="datetimeFigureOut">
               <a:rPr lang="he-IL" smtClean="0"/>
               <a:pPr/>
-              <a:t>י"ב/סיון/תשע"ה</a:t>
+              <a:t>י"ט/אלול/תשע"ה</a:t>
             </a:fld>
             <a:endParaRPr lang="he-IL"/>
           </a:p>
@@ -1164,7 +1164,7 @@
             <a:fld id="{329C895A-E49C-4247-A51B-0504EC639A15}" type="datetimeFigureOut">
               <a:rPr lang="he-IL" smtClean="0"/>
               <a:pPr/>
-              <a:t>י"ב/סיון/תשע"ה</a:t>
+              <a:t>י"ט/אלול/תשע"ה</a:t>
             </a:fld>
             <a:endParaRPr lang="he-IL"/>
           </a:p>
@@ -1351,7 +1351,7 @@
             <a:fld id="{329C895A-E49C-4247-A51B-0504EC639A15}" type="datetimeFigureOut">
               <a:rPr lang="he-IL" smtClean="0"/>
               <a:pPr/>
-              <a:t>י"ב/סיון/תשע"ה</a:t>
+              <a:t>י"ט/אלול/תשע"ה</a:t>
             </a:fld>
             <a:endParaRPr lang="he-IL"/>
           </a:p>
@@ -1528,7 +1528,7 @@
             <a:fld id="{329C895A-E49C-4247-A51B-0504EC639A15}" type="datetimeFigureOut">
               <a:rPr lang="he-IL" smtClean="0"/>
               <a:pPr/>
-              <a:t>י"ב/סיון/תשע"ה</a:t>
+              <a:t>י"ט/אלול/תשע"ה</a:t>
             </a:fld>
             <a:endParaRPr lang="he-IL"/>
           </a:p>
@@ -1798,7 +1798,7 @@
             <a:fld id="{329C895A-E49C-4247-A51B-0504EC639A15}" type="datetimeFigureOut">
               <a:rPr lang="he-IL" smtClean="0"/>
               <a:pPr/>
-              <a:t>י"ב/סיון/תשע"ה</a:t>
+              <a:t>י"ט/אלול/תשע"ה</a:t>
             </a:fld>
             <a:endParaRPr lang="he-IL"/>
           </a:p>
@@ -2268,7 +2268,7 @@
             <a:fld id="{329C895A-E49C-4247-A51B-0504EC639A15}" type="datetimeFigureOut">
               <a:rPr lang="he-IL" smtClean="0"/>
               <a:pPr/>
-              <a:t>י"ב/סיון/תשע"ה</a:t>
+              <a:t>י"ט/אלול/תשע"ה</a:t>
             </a:fld>
             <a:endParaRPr lang="he-IL"/>
           </a:p>
@@ -2759,7 +2759,7 @@
             <a:fld id="{329C895A-E49C-4247-A51B-0504EC639A15}" type="datetimeFigureOut">
               <a:rPr lang="he-IL" smtClean="0"/>
               <a:pPr/>
-              <a:t>י"ב/סיון/תשע"ה</a:t>
+              <a:t>י"ט/אלול/תשע"ה</a:t>
             </a:fld>
             <a:endParaRPr lang="he-IL"/>
           </a:p>
@@ -2887,7 +2887,7 @@
             <a:fld id="{329C895A-E49C-4247-A51B-0504EC639A15}" type="datetimeFigureOut">
               <a:rPr lang="he-IL" smtClean="0"/>
               <a:pPr/>
-              <a:t>י"ב/סיון/תשע"ה</a:t>
+              <a:t>י"ט/אלול/תשע"ה</a:t>
             </a:fld>
             <a:endParaRPr lang="he-IL"/>
           </a:p>
@@ -3033,7 +3033,7 @@
             <a:fld id="{329C895A-E49C-4247-A51B-0504EC639A15}" type="datetimeFigureOut">
               <a:rPr lang="he-IL" smtClean="0"/>
               <a:pPr/>
-              <a:t>י"ב/סיון/תשע"ה</a:t>
+              <a:t>י"ט/אלול/תשע"ה</a:t>
             </a:fld>
             <a:endParaRPr lang="he-IL"/>
           </a:p>
@@ -3357,7 +3357,7 @@
             <a:fld id="{329C895A-E49C-4247-A51B-0504EC639A15}" type="datetimeFigureOut">
               <a:rPr lang="he-IL" smtClean="0"/>
               <a:pPr/>
-              <a:t>י"ב/סיון/תשע"ה</a:t>
+              <a:t>י"ט/אלול/תשע"ה</a:t>
             </a:fld>
             <a:endParaRPr lang="he-IL"/>
           </a:p>
@@ -3493,7 +3493,7 @@
             <a:fld id="{329C895A-E49C-4247-A51B-0504EC639A15}" type="datetimeFigureOut">
               <a:rPr lang="he-IL" smtClean="0"/>
               <a:pPr/>
-              <a:t>י"ב/סיון/תשע"ה</a:t>
+              <a:t>י"ט/אלול/תשע"ה</a:t>
             </a:fld>
             <a:endParaRPr lang="he-IL"/>
           </a:p>
@@ -4276,7 +4276,7 @@
             <a:fld id="{329C895A-E49C-4247-A51B-0504EC639A15}" type="datetimeFigureOut">
               <a:rPr lang="he-IL" smtClean="0"/>
               <a:pPr/>
-              <a:t>י"ב/סיון/תשע"ה</a:t>
+              <a:t>י"ט/אלול/תשע"ה</a:t>
             </a:fld>
             <a:endParaRPr lang="he-IL"/>
           </a:p>
@@ -4815,7 +4815,7 @@
         </p:spPr>
         <p:txBody>
           <a:bodyPr>
-            <a:normAutofit fontScale="85000" lnSpcReduction="20000"/>
+            <a:normAutofit/>
           </a:bodyPr>
           <a:lstStyle/>
           <a:p>
@@ -4824,50 +4824,50 @@
           <a:p>
             <a:pPr algn="ctr" rtl="0"/>
             <a:r>
-              <a:rPr lang="en-US" b="1" dirty="0" smtClean="0"/>
+              <a:rPr lang="en-US" sz="1600" b="1" dirty="0" smtClean="0"/>
               <a:t>Prof.  Yair Neuman</a:t>
             </a:r>
           </a:p>
           <a:p>
             <a:pPr algn="ctr" rtl="0"/>
             <a:r>
-              <a:rPr lang="en-US" dirty="0" smtClean="0"/>
+              <a:rPr lang="en-US" sz="1600" dirty="0" smtClean="0"/>
               <a:t>Ben-Gurion University of the Negev</a:t>
             </a:r>
           </a:p>
           <a:p>
             <a:pPr algn="ctr" rtl="0"/>
             <a:r>
-              <a:rPr lang="en-US" dirty="0" smtClean="0"/>
+              <a:rPr lang="en-US" sz="1600" dirty="0" smtClean="0"/>
               <a:t>co-Director, BIRL, Univ. Toronto</a:t>
             </a:r>
           </a:p>
           <a:p>
             <a:pPr algn="ctr" rtl="0"/>
             <a:r>
-              <a:rPr lang="en-US" dirty="0" smtClean="0"/>
+              <a:rPr lang="en-US" sz="1600" dirty="0" smtClean="0"/>
               <a:t>Visiting Prof.  Weizmann Institute of Science &amp; Oxford University</a:t>
             </a:r>
           </a:p>
           <a:p>
             <a:pPr algn="ctr" rtl="0"/>
             <a:r>
-              <a:rPr lang="en-US" dirty="0" smtClean="0">
+              <a:rPr lang="en-US" sz="1600" dirty="0" smtClean="0">
                 <a:hlinkClick r:id="rId3"/>
               </a:rPr>
               <a:t>yneuman@bgu.ac.il</a:t>
             </a:r>
-            <a:endParaRPr lang="en-US" dirty="0" smtClean="0"/>
+            <a:endParaRPr lang="en-US" sz="1600" dirty="0" smtClean="0"/>
           </a:p>
           <a:p>
             <a:pPr algn="ctr" rtl="0"/>
             <a:r>
-              <a:rPr lang="en-US" dirty="0" smtClean="0">
+              <a:rPr lang="en-US" sz="1600" dirty="0" smtClean="0">
                 <a:hlinkClick r:id="rId4"/>
               </a:rPr>
               <a:t>https://bgu.academia.edu/YairNeuman</a:t>
             </a:r>
-            <a:endParaRPr lang="en-US" dirty="0" smtClean="0"/>
+            <a:endParaRPr lang="en-US" sz="1600" dirty="0" smtClean="0"/>
           </a:p>
           <a:p>
             <a:pPr algn="ctr" rtl="0"/>
@@ -4906,6 +4906,38 @@
           </a:p>
         </p:txBody>
       </p:sp>
+      <p:pic>
+        <p:nvPicPr>
+          <p:cNvPr id="1026" name="Picture 2"/>
+          <p:cNvPicPr>
+            <a:picLocks noChangeAspect="1" noChangeArrowheads="1"/>
+          </p:cNvPicPr>
+          <p:nvPr/>
+        </p:nvPicPr>
+        <p:blipFill>
+          <a:blip r:embed="rId5" cstate="print"/>
+          <a:srcRect/>
+          <a:stretch>
+            <a:fillRect/>
+          </a:stretch>
+        </p:blipFill>
+        <p:spPr bwMode="auto">
+          <a:xfrm>
+            <a:off x="3581400" y="4191000"/>
+            <a:ext cx="3643313" cy="1384300"/>
+          </a:xfrm>
+          <a:prstGeom prst="rect">
+            <a:avLst/>
+          </a:prstGeom>
+          <a:noFill/>
+          <a:ln w="9525">
+            <a:noFill/>
+            <a:miter lim="800000"/>
+            <a:headEnd/>
+            <a:tailEnd/>
+          </a:ln>
+        </p:spPr>
+      </p:pic>
     </p:spTree>
   </p:cSld>
   <p:clrMapOvr>
@@ -9846,11 +9878,7 @@
             </a:pPr>
             <a:r>
               <a:rPr lang="en-US" dirty="0" smtClean="0"/>
-              <a:t>Extraversion: dominant</a:t>
-            </a:r>
-            <a:r>
-              <a:rPr lang="en-US" dirty="0" smtClean="0"/>
-              <a:t>, assertive, authoritarian, forceful, assured, confident, firm, persistent</a:t>
+              <a:t>Extraversion: dominant, assertive, authoritarian, forceful, assured, confident, firm, persistent</a:t>
             </a:r>
           </a:p>
           <a:p>
@@ -11120,15 +11148,7 @@
             </a:pPr>
             <a:r>
               <a:rPr lang="en-US" dirty="0" smtClean="0"/>
-              <a:t>As a Top-Down approach it demands the </a:t>
-            </a:r>
-            <a:r>
-              <a:rPr lang="en-US" dirty="0" smtClean="0"/>
-              <a:t>expert’s </a:t>
-            </a:r>
-            <a:r>
-              <a:rPr lang="en-US" dirty="0" smtClean="0"/>
-              <a:t>knowledge for identifying the relevant words/vectors</a:t>
+              <a:t>As a Top-Down approach it demands the expert’s knowledge for identifying the relevant words/vectors</a:t>
             </a:r>
           </a:p>
           <a:p>
@@ -11282,15 +11302,7 @@
             <a:pPr algn="l" rtl="0"/>
             <a:r>
               <a:rPr lang="en-US" dirty="0" smtClean="0"/>
-              <a:t>The discursive level: </a:t>
-            </a:r>
-            <a:r>
-              <a:rPr lang="en-US" dirty="0" smtClean="0"/>
-              <a:t>Propositions, rather than words, </a:t>
-            </a:r>
-            <a:r>
-              <a:rPr lang="en-US" dirty="0" smtClean="0"/>
-              <a:t>as the target of analysis</a:t>
+              <a:t>The discursive level: Propositions, rather than words, as the target of analysis</a:t>
             </a:r>
           </a:p>
           <a:p>
@@ -11407,21 +11419,12 @@
               <a:rPr lang="en-US" dirty="0" smtClean="0"/>
               <a:t>Understanding the “Pragmatics of Personality” is a must </a:t>
             </a:r>
-            <a:endParaRPr lang="en-US" dirty="0" smtClean="0"/>
           </a:p>
           <a:p>
             <a:pPr algn="l" rtl="0"/>
             <a:r>
               <a:rPr lang="en-US" dirty="0" smtClean="0"/>
-              <a:t>Specifically </a:t>
-            </a:r>
-            <a:r>
-              <a:rPr lang="en-US" dirty="0" smtClean="0"/>
-              <a:t>if </a:t>
-            </a:r>
-            <a:r>
-              <a:rPr lang="en-US" dirty="0" smtClean="0"/>
-              <a:t>we would like to understand personalities beyond their limited Anglo-Saxon cultural context</a:t>
+              <a:t>Specifically if we would like to understand personalities beyond their limited Anglo-Saxon cultural context</a:t>
             </a:r>
             <a:endParaRPr lang="en-US" dirty="0"/>
           </a:p>
@@ -12829,11 +12832,7 @@
             </a:r>
             <a:r>
               <a:rPr lang="en-US" dirty="0" smtClean="0"/>
-              <a:t>(anxious</a:t>
-            </a:r>
-            <a:r>
-              <a:rPr lang="en-US" dirty="0" smtClean="0"/>
-              <a:t>, I)</a:t>
+              <a:t>(anxious, I)</a:t>
             </a:r>
           </a:p>
           <a:p>
@@ -13483,11 +13482,7 @@
             <a:pPr algn="l" rtl="0"/>
             <a:r>
               <a:rPr lang="en-US" dirty="0" smtClean="0"/>
-              <a:t>We tested this methodology on </a:t>
-            </a:r>
-            <a:r>
-              <a:rPr lang="en-US" dirty="0" smtClean="0"/>
-              <a:t>the identification of the FFM</a:t>
+              <a:t>We tested this methodology on the identification of the FFM</a:t>
             </a:r>
           </a:p>
           <a:p>
@@ -14293,17 +14288,12 @@
               <a:rPr lang="en-US" dirty="0" smtClean="0"/>
               <a:t>Can we profile school shooters? </a:t>
             </a:r>
-            <a:endParaRPr lang="en-US" dirty="0" smtClean="0"/>
           </a:p>
           <a:p>
             <a:pPr algn="l" rtl="0"/>
             <a:r>
               <a:rPr lang="en-US" dirty="0" smtClean="0"/>
-              <a:t>Can </a:t>
-            </a:r>
-            <a:r>
-              <a:rPr lang="en-US" dirty="0" smtClean="0"/>
-              <a:t>we use the profile for future screening? </a:t>
+              <a:t>Can we use the profile for future screening? </a:t>
             </a:r>
             <a:endParaRPr lang="en-US" dirty="0"/>
           </a:p>
@@ -15290,19 +15280,7 @@
             </a:r>
             <a:r>
               <a:rPr lang="en-US" sz="2000" dirty="0" smtClean="0"/>
-              <a:t>, </a:t>
-            </a:r>
-            <a:r>
-              <a:rPr lang="en-US" sz="2000" dirty="0" smtClean="0"/>
-              <a:t> P</a:t>
-            </a:r>
-            <a:r>
-              <a:rPr lang="en-US" sz="2000" dirty="0" smtClean="0"/>
-              <a:t>., Neuman, Y., </a:t>
-            </a:r>
-            <a:r>
-              <a:rPr lang="en-US" sz="2000" dirty="0" smtClean="0"/>
-              <a:t> </a:t>
+              <a:t>,  P., Neuman, Y.,  </a:t>
             </a:r>
             <a:r>
               <a:rPr lang="en-US" sz="2000" dirty="0" err="1" smtClean="0"/>
@@ -15310,23 +15288,7 @@
             </a:r>
             <a:r>
               <a:rPr lang="en-US" sz="2000" dirty="0" smtClean="0"/>
-              <a:t>, </a:t>
-            </a:r>
-            <a:r>
-              <a:rPr lang="en-US" sz="2000" dirty="0" smtClean="0"/>
-              <a:t> D</a:t>
-            </a:r>
-            <a:r>
-              <a:rPr lang="en-US" sz="2000" dirty="0" smtClean="0"/>
-              <a:t>., Cohen, Y. (2011). </a:t>
-            </a:r>
-            <a:r>
-              <a:rPr lang="en-US" sz="2000" dirty="0" smtClean="0"/>
-              <a:t> Literal </a:t>
-            </a:r>
-            <a:r>
-              <a:rPr lang="en-US" sz="2000" dirty="0" smtClean="0"/>
-              <a:t>and metaphorical sense identification through concrete and abstract context. In </a:t>
+              <a:t>,  D., Cohen, Y. (2011).  Literal and metaphorical sense identification through concrete and abstract context. In </a:t>
             </a:r>
             <a:r>
               <a:rPr lang="en-US" sz="2000" i="1" dirty="0" smtClean="0"/>
@@ -15418,11 +15380,7 @@
             </a:pPr>
             <a:r>
               <a:rPr lang="en-US" dirty="0" smtClean="0"/>
-              <a:t>Following the automatic identification of sexual predators (Inches </a:t>
-            </a:r>
-            <a:r>
-              <a:rPr lang="en-US" dirty="0" smtClean="0"/>
-              <a:t>&amp; </a:t>
+              <a:t>Following the automatic identification of sexual predators (Inches &amp; </a:t>
             </a:r>
             <a:r>
               <a:rPr lang="en-US" dirty="0" err="1" smtClean="0"/>
@@ -15616,11 +15574,7 @@
             </a:pPr>
             <a:r>
               <a:rPr lang="en-US" dirty="0" smtClean="0"/>
-              <a:t>Tree </a:t>
-            </a:r>
-            <a:r>
-              <a:rPr lang="en-US" dirty="0" smtClean="0"/>
-              <a:t>Classification with CHAID and ten-fold cross-validation procedure and </a:t>
+              <a:t>Tree Classification with CHAID and ten-fold cross-validation procedure and </a:t>
             </a:r>
           </a:p>
           <a:p>
@@ -15635,11 +15589,7 @@
             </a:pPr>
             <a:r>
               <a:rPr lang="en-US" dirty="0" smtClean="0"/>
-              <a:t>K </a:t>
-            </a:r>
-            <a:r>
-              <a:rPr lang="en-US" dirty="0" smtClean="0"/>
-              <a:t>Nearest Neighbors Analysis with ten-fold cross-validation </a:t>
+              <a:t>K Nearest Neighbors Analysis with ten-fold cross-validation </a:t>
             </a:r>
           </a:p>
           <a:p>
@@ -16403,39 +16353,7 @@
             </a:pPr>
             <a:r>
               <a:rPr lang="en-US" sz="2000" dirty="0" smtClean="0"/>
-              <a:t>Neuman, Y., </a:t>
-            </a:r>
-            <a:r>
-              <a:rPr lang="en-US" sz="2000" dirty="0" smtClean="0"/>
-              <a:t> Cohen</a:t>
-            </a:r>
-            <a:r>
-              <a:rPr lang="en-US" sz="2000" dirty="0" smtClean="0"/>
-              <a:t>, Y., </a:t>
-            </a:r>
-            <a:r>
-              <a:rPr lang="en-US" sz="2000" dirty="0" smtClean="0"/>
-              <a:t> &amp; </a:t>
-            </a:r>
-            <a:r>
-              <a:rPr lang="en-US" sz="2000" dirty="0" smtClean="0"/>
-              <a:t>Shahar, </a:t>
-            </a:r>
-            <a:r>
-              <a:rPr lang="en-US" sz="2000" dirty="0" smtClean="0"/>
-              <a:t> G</a:t>
-            </a:r>
-            <a:r>
-              <a:rPr lang="en-US" sz="2000" dirty="0" smtClean="0"/>
-              <a:t>. (in press). </a:t>
-            </a:r>
-            <a:r>
-              <a:rPr lang="en-US" sz="2000" dirty="0" smtClean="0"/>
-              <a:t> A </a:t>
-            </a:r>
-            <a:r>
-              <a:rPr lang="en-US" sz="2000" dirty="0" smtClean="0"/>
-              <a:t>novel computer assisted methodology for leaders' profiling.  </a:t>
+              <a:t>Neuman, Y.,  Cohen, Y.,  &amp; Shahar,  G. (in press).  A novel computer assisted methodology for leaders' profiling.  </a:t>
             </a:r>
             <a:r>
               <a:rPr lang="en-US" sz="2000" i="1" dirty="0" smtClean="0"/>
@@ -22298,15 +22216,7 @@
             </a:pPr>
             <a:r>
               <a:rPr lang="en-US" dirty="0" smtClean="0"/>
-              <a:t>The “understanding” husband: </a:t>
-            </a:r>
-            <a:r>
-              <a:rPr lang="en-US" dirty="0" smtClean="0"/>
-              <a:t> “</a:t>
-            </a:r>
-            <a:r>
-              <a:rPr lang="en-US" dirty="0" smtClean="0"/>
-              <a:t>I must get </a:t>
+              <a:t>The “understanding” husband:  “I must get </a:t>
             </a:r>
             <a:r>
               <a:rPr lang="en-US" dirty="0" smtClean="0">
@@ -22333,15 +22243,7 @@
             </a:pPr>
             <a:r>
               <a:rPr lang="en-US" dirty="0" smtClean="0"/>
-              <a:t>The “non-understanding husband”: </a:t>
-            </a:r>
-            <a:r>
-              <a:rPr lang="en-US" dirty="0" smtClean="0"/>
-              <a:t> “</a:t>
-            </a:r>
-            <a:r>
-              <a:rPr lang="en-US" dirty="0" smtClean="0"/>
-              <a:t>I’m </a:t>
+              <a:t>The “non-understanding husband”:  “I’m </a:t>
             </a:r>
             <a:r>
               <a:rPr lang="en-US" dirty="0" smtClean="0">
@@ -23776,11 +23678,7 @@
             </a:pPr>
             <a:r>
               <a:rPr lang="en-US" sz="1600" dirty="0" smtClean="0"/>
-              <a:t>John, O. P. </a:t>
-            </a:r>
-            <a:r>
-              <a:rPr lang="en-US" sz="1600" dirty="0" smtClean="0"/>
-              <a:t> &amp; </a:t>
+              <a:t>John, O. P.  &amp; </a:t>
             </a:r>
             <a:r>
               <a:rPr lang="en-US" sz="1600" dirty="0" err="1" smtClean="0"/>
@@ -23788,23 +23686,7 @@
             </a:r>
             <a:r>
               <a:rPr lang="en-US" sz="1600" dirty="0" smtClean="0"/>
-              <a:t>, S. </a:t>
-            </a:r>
-            <a:r>
-              <a:rPr lang="en-US" sz="1600" dirty="0" smtClean="0"/>
-              <a:t> (1999).  The </a:t>
-            </a:r>
-            <a:r>
-              <a:rPr lang="en-US" sz="1600" dirty="0" smtClean="0"/>
-              <a:t>Big Five trait taxonomy: History, measurement, and theoretical perspectives. </a:t>
-            </a:r>
-            <a:r>
-              <a:rPr lang="en-US" sz="1600" dirty="0" smtClean="0"/>
-              <a:t> In </a:t>
-            </a:r>
-            <a:r>
-              <a:rPr lang="en-US" sz="1600" dirty="0" smtClean="0"/>
-              <a:t>L.  A. </a:t>
+              <a:t>, S.  (1999).  The Big Five trait taxonomy: History, measurement, and theoretical perspectives.  In L.  A. </a:t>
             </a:r>
             <a:r>
               <a:rPr lang="en-US" sz="1600" dirty="0" err="1" smtClean="0"/>
@@ -23812,43 +23694,15 @@
             </a:r>
             <a:r>
               <a:rPr lang="en-US" sz="1600" dirty="0" smtClean="0"/>
-              <a:t> &amp; </a:t>
+              <a:t> &amp; O.  P.  John (Eds.),  </a:t>
+            </a:r>
+            <a:r>
+              <a:rPr lang="en-US" sz="1600" i="1" dirty="0" smtClean="0"/>
+              <a:t>Handbook of Personality:  Theory and Research</a:t>
             </a:r>
             <a:r>
               <a:rPr lang="en-US" sz="1600" dirty="0" smtClean="0"/>
-              <a:t>O.  P.  John (Eds.), </a:t>
-            </a:r>
-            <a:r>
-              <a:rPr lang="en-US" sz="1600" dirty="0" smtClean="0"/>
-              <a:t> </a:t>
-            </a:r>
-            <a:r>
-              <a:rPr lang="en-US" sz="1600" i="1" dirty="0" smtClean="0"/>
-              <a:t>Handbook </a:t>
-            </a:r>
-            <a:r>
-              <a:rPr lang="en-US" sz="1600" i="1" dirty="0" smtClean="0"/>
-              <a:t>of Personality: </a:t>
-            </a:r>
-            <a:r>
-              <a:rPr lang="en-US" sz="1600" i="1" dirty="0" smtClean="0"/>
-              <a:t> Theory </a:t>
-            </a:r>
-            <a:r>
-              <a:rPr lang="en-US" sz="1600" i="1" dirty="0" smtClean="0"/>
-              <a:t>and Research</a:t>
-            </a:r>
-            <a:r>
-              <a:rPr lang="en-US" sz="1600" dirty="0" smtClean="0"/>
-              <a:t> (pp. 102–138). </a:t>
-            </a:r>
-            <a:r>
-              <a:rPr lang="en-US" sz="1600" dirty="0" smtClean="0"/>
-              <a:t> New </a:t>
-            </a:r>
-            <a:r>
-              <a:rPr lang="en-US" sz="1600" dirty="0" smtClean="0"/>
-              <a:t>York: Guilford Press.</a:t>
+              <a:t> (pp. 102–138).  New York: Guilford Press.</a:t>
             </a:r>
           </a:p>
           <a:p>
@@ -23857,23 +23711,7 @@
             </a:pPr>
             <a:r>
               <a:rPr lang="en-US" sz="1600" dirty="0" smtClean="0"/>
-              <a:t>McCrae, R. </a:t>
-            </a:r>
-            <a:r>
-              <a:rPr lang="en-US" sz="1600" dirty="0" smtClean="0"/>
-              <a:t>R. </a:t>
-            </a:r>
-            <a:r>
-              <a:rPr lang="en-US" sz="1600" dirty="0" smtClean="0"/>
-              <a:t>&amp; John, O.P. </a:t>
-            </a:r>
-            <a:r>
-              <a:rPr lang="en-US" sz="1600" dirty="0" smtClean="0"/>
-              <a:t> (</a:t>
-            </a:r>
-            <a:r>
-              <a:rPr lang="en-US" sz="1600" dirty="0" smtClean="0"/>
-              <a:t>1992).  An introduction to the five‐factor model and its applications. </a:t>
+              <a:t>McCrae, R. R. &amp; John, O.P.  (1992).  An introduction to the five‐factor model and its applications. </a:t>
             </a:r>
             <a:r>
               <a:rPr lang="en-US" sz="1600" i="1" dirty="0" smtClean="0"/>
@@ -24000,51 +23838,7 @@
             </a:pPr>
             <a:r>
               <a:rPr lang="en-US" sz="1700" dirty="0" smtClean="0"/>
-              <a:t> McCrae, R</a:t>
-            </a:r>
-            <a:r>
-              <a:rPr lang="en-US" sz="1700" dirty="0" smtClean="0"/>
-              <a:t>. R </a:t>
-            </a:r>
-            <a:r>
-              <a:rPr lang="en-US" sz="1700" dirty="0" smtClean="0"/>
-              <a:t>&amp; Costa, P. </a:t>
-            </a:r>
-            <a:r>
-              <a:rPr lang="en-US" sz="1700" dirty="0" smtClean="0"/>
-              <a:t> T</a:t>
-            </a:r>
-            <a:r>
-              <a:rPr lang="en-US" sz="1700" dirty="0" smtClean="0"/>
-              <a:t>. (2013). </a:t>
-            </a:r>
-            <a:r>
-              <a:rPr lang="en-US" sz="1700" dirty="0" smtClean="0"/>
-              <a:t> Introduction </a:t>
-            </a:r>
-            <a:r>
-              <a:rPr lang="en-US" sz="1700" dirty="0" smtClean="0"/>
-              <a:t>to the empirical and theoretical status of the five-factor model of personality traits</a:t>
-            </a:r>
-            <a:r>
-              <a:rPr lang="en-US" sz="1700" dirty="0" smtClean="0"/>
-              <a:t>.  </a:t>
-            </a:r>
-            <a:r>
-              <a:rPr lang="en-US" sz="1700" dirty="0" smtClean="0"/>
-              <a:t>In  T. </a:t>
-            </a:r>
-            <a:r>
-              <a:rPr lang="en-US" sz="1700" dirty="0" smtClean="0"/>
-              <a:t> A</a:t>
-            </a:r>
-            <a:r>
-              <a:rPr lang="en-US" sz="1700" dirty="0" smtClean="0"/>
-              <a:t>. </a:t>
-            </a:r>
-            <a:r>
-              <a:rPr lang="en-US" sz="1700" dirty="0" smtClean="0"/>
-              <a:t> </a:t>
+              <a:t> McCrae, R. R &amp; Costa, P.  T. (2013).  Introduction to the empirical and theoretical status of the five-factor model of personality traits.  In  T.  A.  </a:t>
             </a:r>
             <a:r>
               <a:rPr lang="en-US" sz="1700" dirty="0" err="1" smtClean="0"/>
@@ -24052,19 +23846,7 @@
             </a:r>
             <a:r>
               <a:rPr lang="en-US" sz="1700" dirty="0" smtClean="0"/>
-              <a:t> </a:t>
-            </a:r>
-            <a:r>
-              <a:rPr lang="en-US" sz="1700" dirty="0" smtClean="0"/>
-              <a:t>and P. </a:t>
-            </a:r>
-            <a:r>
-              <a:rPr lang="en-US" sz="1700" dirty="0" smtClean="0"/>
-              <a:t> T</a:t>
-            </a:r>
-            <a:r>
-              <a:rPr lang="en-US" sz="1700" dirty="0" smtClean="0"/>
-              <a:t>. </a:t>
+              <a:t> and P.  T. </a:t>
             </a:r>
             <a:r>
               <a:rPr lang="en-US" sz="1700" dirty="0" err="1" smtClean="0"/>
@@ -24072,23 +23854,7 @@
             </a:r>
             <a:r>
               <a:rPr lang="en-US" sz="1700" dirty="0" smtClean="0"/>
-              <a:t>, </a:t>
-            </a:r>
-            <a:r>
-              <a:rPr lang="en-US" sz="1700" dirty="0" smtClean="0"/>
-              <a:t> Costa </a:t>
-            </a:r>
-            <a:r>
-              <a:rPr lang="en-US" sz="1700" dirty="0" smtClean="0"/>
-              <a:t>(Eds.), Personality disorders and the five-factor model of personality. Washington, DC: </a:t>
-            </a:r>
-            <a:r>
-              <a:rPr lang="en-US" sz="1700" dirty="0" smtClean="0"/>
-              <a:t> American </a:t>
-            </a:r>
-            <a:r>
-              <a:rPr lang="en-US" sz="1700" dirty="0" smtClean="0"/>
-              <a:t>Psychology Association.</a:t>
+              <a:t>,  Costa (Eds.), Personality disorders and the five-factor model of personality. Washington, DC:  American Psychology Association.</a:t>
             </a:r>
             <a:endParaRPr lang="en-US" sz="1700" dirty="0"/>
           </a:p>
@@ -25453,47 +25219,15 @@
             </a:pPr>
             <a:r>
               <a:rPr lang="en-US" sz="2000" dirty="0" smtClean="0"/>
-              <a:t>Neuman, Y. </a:t>
+              <a:t>Neuman, Y.  (2014).  Personality from a cognitive-biological perspective.  </a:t>
+            </a:r>
+            <a:r>
+              <a:rPr lang="en-US" sz="2000" i="1" dirty="0" smtClean="0"/>
+              <a:t>Physics of Life Reviews</a:t>
             </a:r>
             <a:r>
               <a:rPr lang="en-US" sz="2000" dirty="0" smtClean="0"/>
-              <a:t> (</a:t>
-            </a:r>
-            <a:r>
-              <a:rPr lang="en-US" sz="2000" dirty="0" smtClean="0"/>
-              <a:t>2014). </a:t>
-            </a:r>
-            <a:r>
-              <a:rPr lang="en-US" sz="2000" dirty="0" smtClean="0"/>
-              <a:t> Personality </a:t>
-            </a:r>
-            <a:r>
-              <a:rPr lang="en-US" sz="2000" dirty="0" smtClean="0"/>
-              <a:t>from a cognitive-biological perspective. </a:t>
-            </a:r>
-            <a:r>
-              <a:rPr lang="en-US" sz="2000" dirty="0" smtClean="0"/>
-              <a:t> </a:t>
-            </a:r>
-            <a:r>
-              <a:rPr lang="en-US" sz="2000" i="1" dirty="0" smtClean="0"/>
-              <a:t>Physics </a:t>
-            </a:r>
-            <a:r>
-              <a:rPr lang="en-US" sz="2000" i="1" dirty="0" smtClean="0"/>
-              <a:t>of Life Reviews</a:t>
-            </a:r>
-            <a:r>
-              <a:rPr lang="en-US" sz="2000" dirty="0" smtClean="0"/>
-              <a:t>, 11, </a:t>
-            </a:r>
-            <a:r>
-              <a:rPr lang="en-US" sz="2000" dirty="0" smtClean="0"/>
-              <a:t> 650-686</a:t>
-            </a:r>
-            <a:r>
-              <a:rPr lang="en-US" sz="2000" dirty="0" smtClean="0"/>
-              <a:t>. </a:t>
+              <a:t>, 11,  650-686. </a:t>
             </a:r>
             <a:endParaRPr lang="en-US" sz="2000" dirty="0"/>
           </a:p>
@@ -25709,31 +25443,7 @@
             </a:r>
             <a:r>
               <a:rPr lang="en-US" sz="1600" dirty="0" smtClean="0"/>
-              <a:t>, P. </a:t>
-            </a:r>
-            <a:r>
-              <a:rPr lang="en-US" sz="1600" dirty="0" smtClean="0"/>
-              <a:t> C </a:t>
-            </a:r>
-            <a:r>
-              <a:rPr lang="en-US" sz="1600" dirty="0" smtClean="0"/>
-              <a:t>&amp; Campbell, </a:t>
-            </a:r>
-            <a:r>
-              <a:rPr lang="en-US" sz="1600" dirty="0" smtClean="0"/>
-              <a:t> C</a:t>
-            </a:r>
-            <a:r>
-              <a:rPr lang="en-US" sz="1600" dirty="0" smtClean="0"/>
-              <a:t>. </a:t>
-            </a:r>
-            <a:r>
-              <a:rPr lang="en-US" sz="1600" dirty="0" smtClean="0"/>
-              <a:t> G</a:t>
-            </a:r>
-            <a:r>
-              <a:rPr lang="en-US" sz="1600" dirty="0" smtClean="0"/>
-              <a:t>.  (2009).  The new person-specific paradigm in psychology. </a:t>
+              <a:t>, P.  C &amp; Campbell,  C.  G.  (2009).  The new person-specific paradigm in psychology. </a:t>
             </a:r>
             <a:r>
               <a:rPr lang="en-US" sz="1600" dirty="0" err="1" smtClean="0"/>
@@ -25749,23 +25459,7 @@
             </a:r>
             <a:r>
               <a:rPr lang="en-US" sz="1600" dirty="0" smtClean="0"/>
-              <a:t> </a:t>
-            </a:r>
-            <a:r>
-              <a:rPr lang="en-US" sz="1600" dirty="0" smtClean="0"/>
-              <a:t>. Sci. </a:t>
-            </a:r>
-            <a:r>
-              <a:rPr lang="en-US" sz="1600" dirty="0" smtClean="0"/>
-              <a:t>18(2</a:t>
-            </a:r>
-            <a:r>
-              <a:rPr lang="en-US" sz="1600" dirty="0" smtClean="0"/>
-              <a:t>),  112–7</a:t>
-            </a:r>
-            <a:r>
-              <a:rPr lang="en-US" sz="1600" dirty="0" smtClean="0"/>
-              <a:t>.</a:t>
+              <a:t> . Sci. 18(2),  112–7.</a:t>
             </a:r>
           </a:p>
           <a:p>
@@ -26646,15 +26340,7 @@
             </a:pPr>
             <a:r>
               <a:rPr lang="en-US" sz="1900" dirty="0" smtClean="0"/>
-              <a:t>*Davis, K. L</a:t>
-            </a:r>
-            <a:r>
-              <a:rPr lang="en-US" sz="1900" dirty="0" smtClean="0"/>
-              <a:t>. </a:t>
-            </a:r>
-            <a:r>
-              <a:rPr lang="en-US" sz="1900" dirty="0" smtClean="0"/>
-              <a:t>&amp; </a:t>
+              <a:t>*Davis, K. L. &amp; </a:t>
             </a:r>
             <a:r>
               <a:rPr lang="en-US" sz="1900" dirty="0" err="1" smtClean="0"/>
@@ -28778,19 +28464,7 @@
             </a:r>
             <a:r>
               <a:rPr lang="en-US" sz="2000" dirty="0" smtClean="0"/>
-              <a:t>, </a:t>
-            </a:r>
-            <a:r>
-              <a:rPr lang="en-US" sz="2000" dirty="0" smtClean="0"/>
-              <a:t> D </a:t>
-            </a:r>
-            <a:r>
-              <a:rPr lang="en-US" sz="2000" dirty="0" smtClean="0"/>
-              <a:t>&amp; Cohen, Y. (in press).  Automatic identification of the splitting defense mechanism in texts.  In M. </a:t>
-            </a:r>
-            <a:r>
-              <a:rPr lang="en-US" sz="2000" dirty="0" smtClean="0"/>
-              <a:t> </a:t>
+              <a:t>,  D &amp; Cohen, Y. (in press).  Automatic identification of the splitting defense mechanism in texts.  In M.  </a:t>
             </a:r>
             <a:r>
               <a:rPr lang="en-US" sz="2000" dirty="0" err="1" smtClean="0"/>
@@ -28798,11 +28472,7 @@
             </a:r>
             <a:r>
               <a:rPr lang="en-US" sz="2000" dirty="0" smtClean="0"/>
-              <a:t> </a:t>
-            </a:r>
-            <a:r>
-              <a:rPr lang="en-US" sz="2000" dirty="0" smtClean="0"/>
-              <a:t>&amp; M. Danesi (Eds.), </a:t>
+              <a:t> &amp; M. Danesi (Eds.), </a:t>
             </a:r>
             <a:r>
               <a:rPr lang="en-US" sz="2000" i="1" dirty="0" smtClean="0"/>
@@ -29251,31 +28921,7 @@
             <a:pPr algn="l" rtl="0"/>
             <a:r>
               <a:rPr lang="en-US" dirty="0" smtClean="0"/>
-              <a:t>Perfectionists, </a:t>
-            </a:r>
-            <a:r>
-              <a:rPr lang="en-US" dirty="0" smtClean="0"/>
-              <a:t> hard-workers</a:t>
-            </a:r>
-            <a:r>
-              <a:rPr lang="en-US" dirty="0" smtClean="0"/>
-              <a:t>, </a:t>
-            </a:r>
-            <a:r>
-              <a:rPr lang="en-US" dirty="0" smtClean="0"/>
-              <a:t> believe </a:t>
-            </a:r>
-            <a:r>
-              <a:rPr lang="en-US" dirty="0" smtClean="0"/>
-              <a:t>in work ethics, </a:t>
-            </a:r>
-            <a:r>
-              <a:rPr lang="en-US" dirty="0" smtClean="0"/>
-              <a:t>task-oriented </a:t>
-            </a:r>
-            <a:r>
-              <a:rPr lang="en-US" dirty="0" smtClean="0"/>
-              <a:t>and put their emotions aside when the work has to be done </a:t>
+              <a:t>Perfectionists,  hard-workers,  believe in work ethics, task-oriented and put their emotions aside when the work has to be done </a:t>
             </a:r>
           </a:p>
           <a:p>
@@ -30057,15 +29703,7 @@
             </a:r>
             <a:r>
               <a:rPr lang="en-US" dirty="0" smtClean="0"/>
-              <a:t>: </a:t>
-            </a:r>
-            <a:r>
-              <a:rPr lang="en-US" dirty="0" smtClean="0"/>
-              <a:t> Attacking/Being </a:t>
-            </a:r>
-            <a:r>
-              <a:rPr lang="en-US" dirty="0" smtClean="0"/>
-              <a:t>attacked by humiliating others</a:t>
+              <a:t>:  Attacking/Being attacked by humiliating others</a:t>
             </a:r>
           </a:p>
           <a:p>
@@ -30080,15 +29718,7 @@
             </a:r>
             <a:r>
               <a:rPr lang="en-US" dirty="0" smtClean="0"/>
-              <a:t>: </a:t>
-            </a:r>
-            <a:r>
-              <a:rPr lang="en-US" dirty="0" smtClean="0"/>
-              <a:t>Fear</a:t>
-            </a:r>
-            <a:r>
-              <a:rPr lang="en-US" dirty="0" smtClean="0"/>
-              <a:t>, rage</a:t>
+              <a:t>: Fear, rage</a:t>
             </a:r>
           </a:p>
           <a:p>
@@ -30103,15 +29733,7 @@
             </a:r>
             <a:r>
               <a:rPr lang="en-US" dirty="0" smtClean="0"/>
-              <a:t>: </a:t>
-            </a:r>
-            <a:r>
-              <a:rPr lang="en-US" dirty="0" smtClean="0"/>
-              <a:t> The </a:t>
-            </a:r>
-            <a:r>
-              <a:rPr lang="en-US" dirty="0" smtClean="0"/>
-              <a:t>world is full of potential attackers and users</a:t>
+              <a:t>:  The world is full of potential attackers and users</a:t>
             </a:r>
           </a:p>
           <a:p>
@@ -31062,15 +30684,7 @@
             </a:pPr>
             <a:r>
               <a:rPr lang="en-US" sz="1600" dirty="0" smtClean="0"/>
-              <a:t>Gigerenzer, </a:t>
-            </a:r>
-            <a:r>
-              <a:rPr lang="en-US" sz="1600" dirty="0" smtClean="0"/>
-              <a:t> G</a:t>
-            </a:r>
-            <a:r>
-              <a:rPr lang="en-US" sz="1600" dirty="0" smtClean="0"/>
-              <a:t>., &amp; Todd, P. M. (1999).  </a:t>
+              <a:t>Gigerenzer,  G., &amp; Todd, P. M. (1999).  </a:t>
             </a:r>
             <a:r>
               <a:rPr lang="en-US" sz="1600" i="1" dirty="0" smtClean="0"/>
@@ -31551,15 +31165,7 @@
             <a:pPr algn="l" rtl="0"/>
             <a:r>
               <a:rPr lang="en-US" sz="2000" dirty="0" smtClean="0"/>
-              <a:t>invented a new drug for </a:t>
-            </a:r>
-            <a:r>
-              <a:rPr lang="en-US" sz="2000" dirty="0" smtClean="0"/>
-              <a:t>   healing </a:t>
-            </a:r>
-            <a:r>
-              <a:rPr lang="en-US" sz="2000" dirty="0" smtClean="0"/>
-              <a:t>Cancer!</a:t>
+              <a:t>invented a new drug for    healing Cancer!</a:t>
             </a:r>
             <a:endParaRPr lang="en-US" sz="2000" dirty="0"/>
           </a:p>
@@ -31648,15 +31254,7 @@
             <a:pPr algn="l" rtl="0"/>
             <a:r>
               <a:rPr lang="en-US" dirty="0" smtClean="0"/>
-              <a:t>He was shocked when I explained that I don’t really know his </a:t>
-            </a:r>
-            <a:r>
-              <a:rPr lang="en-US" dirty="0" smtClean="0"/>
-              <a:t>mother-in-law </a:t>
-            </a:r>
-            <a:r>
-              <a:rPr lang="en-US" dirty="0" smtClean="0"/>
-              <a:t>… </a:t>
+              <a:t>He was shocked when I explained that I don’t really know his mother-in-law … </a:t>
             </a:r>
             <a:endParaRPr lang="en-US" dirty="0"/>
           </a:p>
@@ -32073,19 +31671,7 @@
             </a:r>
             <a:r>
               <a:rPr lang="en-US" sz="1800" dirty="0" smtClean="0"/>
-              <a:t>, </a:t>
-            </a:r>
-            <a:r>
-              <a:rPr lang="en-US" sz="1800" dirty="0" smtClean="0"/>
-              <a:t> D</a:t>
-            </a:r>
-            <a:r>
-              <a:rPr lang="en-US" sz="1800" dirty="0" smtClean="0"/>
-              <a:t>., </a:t>
-            </a:r>
-            <a:r>
-              <a:rPr lang="en-US" sz="1800" dirty="0" smtClean="0"/>
-              <a:t> </a:t>
+              <a:t>,  D.,  </a:t>
             </a:r>
             <a:r>
               <a:rPr lang="en-US" sz="1800" dirty="0" err="1" smtClean="0"/>
@@ -32093,27 +31679,7 @@
             </a:r>
             <a:r>
               <a:rPr lang="en-US" sz="1800" dirty="0" smtClean="0"/>
-              <a:t>, </a:t>
-            </a:r>
-            <a:r>
-              <a:rPr lang="en-US" sz="1800" dirty="0" smtClean="0"/>
-              <a:t> J</a:t>
-            </a:r>
-            <a:r>
-              <a:rPr lang="en-US" sz="1800" dirty="0" smtClean="0"/>
-              <a:t>., Bradley, </a:t>
-            </a:r>
-            <a:r>
-              <a:rPr lang="en-US" sz="1800" dirty="0" smtClean="0"/>
-              <a:t> B</a:t>
-            </a:r>
-            <a:r>
-              <a:rPr lang="en-US" sz="1800" dirty="0" smtClean="0"/>
-              <a:t>. </a:t>
-            </a:r>
-            <a:r>
-              <a:rPr lang="en-US" sz="1800" dirty="0" smtClean="0"/>
-              <a:t> &amp; </a:t>
+              <a:t>,  J., Bradley,  B.  &amp; </a:t>
             </a:r>
             <a:r>
               <a:rPr lang="en-US" sz="1800" dirty="0" err="1" smtClean="0"/>
@@ -32121,31 +31687,7 @@
             </a:r>
             <a:r>
               <a:rPr lang="en-US" sz="1800" dirty="0" smtClean="0"/>
-              <a:t>, </a:t>
-            </a:r>
-            <a:r>
-              <a:rPr lang="en-US" sz="1800" dirty="0" smtClean="0"/>
-              <a:t> J</a:t>
-            </a:r>
-            <a:r>
-              <a:rPr lang="en-US" sz="1800" dirty="0" smtClean="0"/>
-              <a:t>. </a:t>
-            </a:r>
-            <a:r>
-              <a:rPr lang="en-US" sz="1800" dirty="0" smtClean="0"/>
-              <a:t> A</a:t>
-            </a:r>
-            <a:r>
-              <a:rPr lang="en-US" sz="1800" dirty="0" smtClean="0"/>
-              <a:t>.  (2012). </a:t>
-            </a:r>
-            <a:r>
-              <a:rPr lang="en-US" sz="1800" dirty="0" smtClean="0"/>
-              <a:t> An </a:t>
-            </a:r>
-            <a:r>
-              <a:rPr lang="en-US" sz="1800" dirty="0" smtClean="0"/>
-              <a:t>empirically derived taxonomy for personality diagnosis: bridging science and practice in conceptualizing personality.  </a:t>
+              <a:t>,  J.  A.  (2012).  An empirically derived taxonomy for personality diagnosis: bridging science and practice in conceptualizing personality.  </a:t>
             </a:r>
             <a:r>
               <a:rPr lang="en-US" sz="1800" i="1" dirty="0" smtClean="0"/>
@@ -39358,15 +38900,7 @@
             </a:pPr>
             <a:r>
               <a:rPr lang="en-US" dirty="0" smtClean="0"/>
-              <a:t>Harvard, </a:t>
-            </a:r>
-            <a:r>
-              <a:rPr lang="en-US" dirty="0" smtClean="0"/>
-              <a:t> Manhattan</a:t>
-            </a:r>
-            <a:r>
-              <a:rPr lang="en-US" dirty="0" smtClean="0"/>
-              <a:t>, Cartier, Ferrari, Remy Martin Cognac, etc. </a:t>
+              <a:t>Harvard,  Manhattan, Cartier, Ferrari, Remy Martin Cognac, etc. </a:t>
             </a:r>
             <a:endParaRPr lang="en-US" dirty="0"/>
           </a:p>
@@ -39476,28 +39010,14 @@
                 <a:latin typeface="Times New Roman" pitchFamily="18" charset="0"/>
                 <a:cs typeface="Times New Roman" pitchFamily="18" charset="0"/>
               </a:rPr>
-              <a:t>, J. (1998). </a:t>
-            </a:r>
-            <a:r>
-              <a:rPr lang="en-US" sz="2000" dirty="0" smtClean="0">
-                <a:latin typeface="Times New Roman" pitchFamily="18" charset="0"/>
-                <a:cs typeface="Times New Roman" pitchFamily="18" charset="0"/>
-              </a:rPr>
-              <a:t> </a:t>
+              <a:t>, J. (1998).  </a:t>
             </a:r>
             <a:r>
               <a:rPr lang="en-US" sz="2000" i="1" dirty="0" smtClean="0">
                 <a:latin typeface="Times New Roman" pitchFamily="18" charset="0"/>
                 <a:cs typeface="Times New Roman" pitchFamily="18" charset="0"/>
               </a:rPr>
-              <a:t>Affective </a:t>
-            </a:r>
-            <a:r>
-              <a:rPr lang="en-US" sz="2000" i="1" dirty="0" smtClean="0">
-                <a:latin typeface="Times New Roman" pitchFamily="18" charset="0"/>
-                <a:cs typeface="Times New Roman" pitchFamily="18" charset="0"/>
-              </a:rPr>
-              <a:t>neuroscience: The foundations of human and animal emotions</a:t>
+              <a:t>Affective neuroscience: The foundations of human and animal emotions</a:t>
             </a:r>
             <a:r>
               <a:rPr lang="en-US" sz="2000" dirty="0" smtClean="0">

</xml_diff>